<commit_message>
Update splitting/interpolation figure for paper
</commit_message>
<xml_diff>
--- a/paper_results/plots/glucose_data_split_plot_corrected.pptx
+++ b/paper_results/plots/glucose_data_split_plot_corrected.pptx
@@ -6,6 +6,7 @@
   </p:sldMasterIdLst>
   <p:sldIdLst>
     <p:sldId id="257" r:id="rId2"/>
+    <p:sldId id="258" r:id="rId3"/>
   </p:sldIdLst>
   <p:sldSz cx="12192000" cy="6858000"/>
   <p:notesSz cx="6858000" cy="9144000"/>
@@ -261,7 +262,7 @@
           <a:p>
             <a:fld id="{95245831-A476-904B-93A5-A04577E394FD}" type="datetimeFigureOut">
               <a:rPr lang="ru-US" smtClean="0"/>
-              <a:t>4/16/23</a:t>
+              <a:t>4/29/23</a:t>
             </a:fld>
             <a:endParaRPr lang="ru-US"/>
           </a:p>
@@ -461,7 +462,7 @@
           <a:p>
             <a:fld id="{95245831-A476-904B-93A5-A04577E394FD}" type="datetimeFigureOut">
               <a:rPr lang="ru-US" smtClean="0"/>
-              <a:t>4/16/23</a:t>
+              <a:t>4/29/23</a:t>
             </a:fld>
             <a:endParaRPr lang="ru-US"/>
           </a:p>
@@ -671,7 +672,7 @@
           <a:p>
             <a:fld id="{95245831-A476-904B-93A5-A04577E394FD}" type="datetimeFigureOut">
               <a:rPr lang="ru-US" smtClean="0"/>
-              <a:t>4/16/23</a:t>
+              <a:t>4/29/23</a:t>
             </a:fld>
             <a:endParaRPr lang="ru-US"/>
           </a:p>
@@ -871,7 +872,7 @@
           <a:p>
             <a:fld id="{95245831-A476-904B-93A5-A04577E394FD}" type="datetimeFigureOut">
               <a:rPr lang="ru-US" smtClean="0"/>
-              <a:t>4/16/23</a:t>
+              <a:t>4/29/23</a:t>
             </a:fld>
             <a:endParaRPr lang="ru-US"/>
           </a:p>
@@ -1147,7 +1148,7 @@
           <a:p>
             <a:fld id="{95245831-A476-904B-93A5-A04577E394FD}" type="datetimeFigureOut">
               <a:rPr lang="ru-US" smtClean="0"/>
-              <a:t>4/16/23</a:t>
+              <a:t>4/29/23</a:t>
             </a:fld>
             <a:endParaRPr lang="ru-US"/>
           </a:p>
@@ -1415,7 +1416,7 @@
           <a:p>
             <a:fld id="{95245831-A476-904B-93A5-A04577E394FD}" type="datetimeFigureOut">
               <a:rPr lang="ru-US" smtClean="0"/>
-              <a:t>4/16/23</a:t>
+              <a:t>4/29/23</a:t>
             </a:fld>
             <a:endParaRPr lang="ru-US"/>
           </a:p>
@@ -1830,7 +1831,7 @@
           <a:p>
             <a:fld id="{95245831-A476-904B-93A5-A04577E394FD}" type="datetimeFigureOut">
               <a:rPr lang="ru-US" smtClean="0"/>
-              <a:t>4/16/23</a:t>
+              <a:t>4/29/23</a:t>
             </a:fld>
             <a:endParaRPr lang="ru-US"/>
           </a:p>
@@ -1972,7 +1973,7 @@
           <a:p>
             <a:fld id="{95245831-A476-904B-93A5-A04577E394FD}" type="datetimeFigureOut">
               <a:rPr lang="ru-US" smtClean="0"/>
-              <a:t>4/16/23</a:t>
+              <a:t>4/29/23</a:t>
             </a:fld>
             <a:endParaRPr lang="ru-US"/>
           </a:p>
@@ -2085,7 +2086,7 @@
           <a:p>
             <a:fld id="{95245831-A476-904B-93A5-A04577E394FD}" type="datetimeFigureOut">
               <a:rPr lang="ru-US" smtClean="0"/>
-              <a:t>4/16/23</a:t>
+              <a:t>4/29/23</a:t>
             </a:fld>
             <a:endParaRPr lang="ru-US"/>
           </a:p>
@@ -2398,7 +2399,7 @@
           <a:p>
             <a:fld id="{95245831-A476-904B-93A5-A04577E394FD}" type="datetimeFigureOut">
               <a:rPr lang="ru-US" smtClean="0"/>
-              <a:t>4/16/23</a:t>
+              <a:t>4/29/23</a:t>
             </a:fld>
             <a:endParaRPr lang="ru-US"/>
           </a:p>
@@ -2687,7 +2688,7 @@
           <a:p>
             <a:fld id="{95245831-A476-904B-93A5-A04577E394FD}" type="datetimeFigureOut">
               <a:rPr lang="ru-US" smtClean="0"/>
-              <a:t>4/16/23</a:t>
+              <a:t>4/29/23</a:t>
             </a:fld>
             <a:endParaRPr lang="ru-US"/>
           </a:p>
@@ -2930,7 +2931,7 @@
           <a:p>
             <a:fld id="{95245831-A476-904B-93A5-A04577E394FD}" type="datetimeFigureOut">
               <a:rPr lang="ru-US" smtClean="0"/>
-              <a:t>4/16/23</a:t>
+              <a:t>4/29/23</a:t>
             </a:fld>
             <a:endParaRPr lang="ru-US"/>
           </a:p>
@@ -3445,7 +3446,7 @@
             <a:lstStyle/>
             <a:p>
               <a:pPr algn="ctr"/>
-              <a:endParaRPr lang="ru-US"/>
+              <a:endParaRPr lang="ru-US" dirty="0"/>
             </a:p>
           </p:txBody>
         </p:sp>
@@ -3596,6 +3597,889 @@
     <p:extLst>
       <p:ext uri="{BB962C8B-B14F-4D97-AF65-F5344CB8AC3E}">
         <p14:creationId xmlns:p14="http://schemas.microsoft.com/office/powerpoint/2010/main" val="727201412"/>
+      </p:ext>
+    </p:extLst>
+  </p:cSld>
+  <p:clrMapOvr>
+    <a:masterClrMapping/>
+  </p:clrMapOvr>
+</p:sld>
+</file>
+
+<file path=ppt/slides/slide2.xml><?xml version="1.0" encoding="utf-8"?>
+<p:sld xmlns:a="http://schemas.openxmlformats.org/drawingml/2006/main" xmlns:r="http://schemas.openxmlformats.org/officeDocument/2006/relationships" xmlns:p="http://schemas.openxmlformats.org/presentationml/2006/main">
+  <p:cSld>
+    <p:bg>
+      <p:bgPr>
+        <a:solidFill>
+          <a:schemeClr val="bg1"/>
+        </a:solidFill>
+        <a:effectLst/>
+      </p:bgPr>
+    </p:bg>
+    <p:spTree>
+      <p:nvGrpSpPr>
+        <p:cNvPr id="1" name=""/>
+        <p:cNvGrpSpPr/>
+        <p:nvPr/>
+      </p:nvGrpSpPr>
+      <p:grpSpPr>
+        <a:xfrm>
+          <a:off x="0" y="0"/>
+          <a:ext cx="0" cy="0"/>
+          <a:chOff x="0" y="0"/>
+          <a:chExt cx="0" cy="0"/>
+        </a:xfrm>
+      </p:grpSpPr>
+      <p:grpSp>
+        <p:nvGrpSpPr>
+          <p:cNvPr id="41" name="Группа 40">
+            <a:extLst>
+              <a:ext uri="{FF2B5EF4-FFF2-40B4-BE49-F238E27FC236}">
+                <a16:creationId xmlns:a16="http://schemas.microsoft.com/office/drawing/2014/main" id="{02BCB7E5-2878-C6B3-F961-B529CD110C1A}"/>
+              </a:ext>
+            </a:extLst>
+          </p:cNvPr>
+          <p:cNvGrpSpPr/>
+          <p:nvPr/>
+        </p:nvGrpSpPr>
+        <p:grpSpPr>
+          <a:xfrm>
+            <a:off x="0" y="-30892"/>
+            <a:ext cx="12192000" cy="6919784"/>
+            <a:chOff x="0" y="-30892"/>
+            <a:chExt cx="12192000" cy="6919784"/>
+          </a:xfrm>
+        </p:grpSpPr>
+        <p:grpSp>
+          <p:nvGrpSpPr>
+            <p:cNvPr id="39" name="Группа 38">
+              <a:extLst>
+                <a:ext uri="{FF2B5EF4-FFF2-40B4-BE49-F238E27FC236}">
+                  <a16:creationId xmlns:a16="http://schemas.microsoft.com/office/drawing/2014/main" id="{3E91AB21-0071-594E-ED00-5E87BDECAB60}"/>
+                </a:ext>
+              </a:extLst>
+            </p:cNvPr>
+            <p:cNvGrpSpPr/>
+            <p:nvPr/>
+          </p:nvGrpSpPr>
+          <p:grpSpPr>
+            <a:xfrm>
+              <a:off x="0" y="-30892"/>
+              <a:ext cx="12192000" cy="6919784"/>
+              <a:chOff x="0" y="-30892"/>
+              <a:chExt cx="12192000" cy="6919784"/>
+            </a:xfrm>
+          </p:grpSpPr>
+          <p:grpSp>
+            <p:nvGrpSpPr>
+              <p:cNvPr id="38" name="Группа 37">
+                <a:extLst>
+                  <a:ext uri="{FF2B5EF4-FFF2-40B4-BE49-F238E27FC236}">
+                    <a16:creationId xmlns:a16="http://schemas.microsoft.com/office/drawing/2014/main" id="{71CDEC41-41B6-7F47-CEE1-E41E9D55A18B}"/>
+                  </a:ext>
+                </a:extLst>
+              </p:cNvPr>
+              <p:cNvGrpSpPr/>
+              <p:nvPr/>
+            </p:nvGrpSpPr>
+            <p:grpSpPr>
+              <a:xfrm>
+                <a:off x="0" y="-30892"/>
+                <a:ext cx="12192000" cy="6919784"/>
+                <a:chOff x="0" y="-30892"/>
+                <a:chExt cx="12192000" cy="6919784"/>
+              </a:xfrm>
+            </p:grpSpPr>
+            <p:grpSp>
+              <p:nvGrpSpPr>
+                <p:cNvPr id="33" name="Группа 32">
+                  <a:extLst>
+                    <a:ext uri="{FF2B5EF4-FFF2-40B4-BE49-F238E27FC236}">
+                      <a16:creationId xmlns:a16="http://schemas.microsoft.com/office/drawing/2014/main" id="{A49520FB-57B8-4C65-9CFE-AB323B11C2BB}"/>
+                    </a:ext>
+                  </a:extLst>
+                </p:cNvPr>
+                <p:cNvGrpSpPr/>
+                <p:nvPr/>
+              </p:nvGrpSpPr>
+              <p:grpSpPr>
+                <a:xfrm>
+                  <a:off x="0" y="-30892"/>
+                  <a:ext cx="12192000" cy="6919784"/>
+                  <a:chOff x="0" y="-30892"/>
+                  <a:chExt cx="12192000" cy="6919784"/>
+                </a:xfrm>
+              </p:grpSpPr>
+              <p:grpSp>
+                <p:nvGrpSpPr>
+                  <p:cNvPr id="31" name="Группа 30">
+                    <a:extLst>
+                      <a:ext uri="{FF2B5EF4-FFF2-40B4-BE49-F238E27FC236}">
+                        <a16:creationId xmlns:a16="http://schemas.microsoft.com/office/drawing/2014/main" id="{B7C91320-D07A-E6C4-6EE4-15F9D1660C6F}"/>
+                      </a:ext>
+                    </a:extLst>
+                  </p:cNvPr>
+                  <p:cNvGrpSpPr/>
+                  <p:nvPr/>
+                </p:nvGrpSpPr>
+                <p:grpSpPr>
+                  <a:xfrm>
+                    <a:off x="0" y="-30892"/>
+                    <a:ext cx="12192000" cy="6919784"/>
+                    <a:chOff x="0" y="-61784"/>
+                    <a:chExt cx="12192000" cy="6919784"/>
+                  </a:xfrm>
+                </p:grpSpPr>
+                <p:grpSp>
+                  <p:nvGrpSpPr>
+                    <p:cNvPr id="29" name="Группа 28">
+                      <a:extLst>
+                        <a:ext uri="{FF2B5EF4-FFF2-40B4-BE49-F238E27FC236}">
+                          <a16:creationId xmlns:a16="http://schemas.microsoft.com/office/drawing/2014/main" id="{672016C9-A782-E6F9-6694-B15B4276E466}"/>
+                        </a:ext>
+                      </a:extLst>
+                    </p:cNvPr>
+                    <p:cNvGrpSpPr/>
+                    <p:nvPr/>
+                  </p:nvGrpSpPr>
+                  <p:grpSpPr>
+                    <a:xfrm>
+                      <a:off x="0" y="-61784"/>
+                      <a:ext cx="12192000" cy="6919784"/>
+                      <a:chOff x="0" y="-61784"/>
+                      <a:chExt cx="12192000" cy="6919784"/>
+                    </a:xfrm>
+                  </p:grpSpPr>
+                  <p:grpSp>
+                    <p:nvGrpSpPr>
+                      <p:cNvPr id="27" name="Группа 26">
+                        <a:extLst>
+                          <a:ext uri="{FF2B5EF4-FFF2-40B4-BE49-F238E27FC236}">
+                            <a16:creationId xmlns:a16="http://schemas.microsoft.com/office/drawing/2014/main" id="{F53C5736-65C0-0228-0C9C-3775702A5303}"/>
+                          </a:ext>
+                        </a:extLst>
+                      </p:cNvPr>
+                      <p:cNvGrpSpPr/>
+                      <p:nvPr/>
+                    </p:nvGrpSpPr>
+                    <p:grpSpPr>
+                      <a:xfrm>
+                        <a:off x="0" y="-61784"/>
+                        <a:ext cx="12192000" cy="6919784"/>
+                        <a:chOff x="0" y="-61784"/>
+                        <a:chExt cx="12192000" cy="6919784"/>
+                      </a:xfrm>
+                    </p:grpSpPr>
+                    <p:grpSp>
+                      <p:nvGrpSpPr>
+                        <p:cNvPr id="25" name="Группа 24">
+                          <a:extLst>
+                            <a:ext uri="{FF2B5EF4-FFF2-40B4-BE49-F238E27FC236}">
+                              <a16:creationId xmlns:a16="http://schemas.microsoft.com/office/drawing/2014/main" id="{0B68CC8F-3534-66AD-03C4-B21941198505}"/>
+                            </a:ext>
+                          </a:extLst>
+                        </p:cNvPr>
+                        <p:cNvGrpSpPr/>
+                        <p:nvPr/>
+                      </p:nvGrpSpPr>
+                      <p:grpSpPr>
+                        <a:xfrm>
+                          <a:off x="0" y="-61784"/>
+                          <a:ext cx="12192000" cy="6919784"/>
+                          <a:chOff x="46893" y="125785"/>
+                          <a:chExt cx="12192000" cy="6919784"/>
+                        </a:xfrm>
+                      </p:grpSpPr>
+                      <p:grpSp>
+                        <p:nvGrpSpPr>
+                          <p:cNvPr id="21" name="Группа 20">
+                            <a:extLst>
+                              <a:ext uri="{FF2B5EF4-FFF2-40B4-BE49-F238E27FC236}">
+                                <a16:creationId xmlns:a16="http://schemas.microsoft.com/office/drawing/2014/main" id="{353B8B49-88A8-8187-602F-678357B2850F}"/>
+                              </a:ext>
+                            </a:extLst>
+                          </p:cNvPr>
+                          <p:cNvGrpSpPr/>
+                          <p:nvPr/>
+                        </p:nvGrpSpPr>
+                        <p:grpSpPr>
+                          <a:xfrm>
+                            <a:off x="46893" y="125785"/>
+                            <a:ext cx="12192000" cy="6919784"/>
+                            <a:chOff x="46893" y="125785"/>
+                            <a:chExt cx="12192000" cy="6919784"/>
+                          </a:xfrm>
+                        </p:grpSpPr>
+                        <p:grpSp>
+                          <p:nvGrpSpPr>
+                            <p:cNvPr id="17" name="Группа 16">
+                              <a:extLst>
+                                <a:ext uri="{FF2B5EF4-FFF2-40B4-BE49-F238E27FC236}">
+                                  <a16:creationId xmlns:a16="http://schemas.microsoft.com/office/drawing/2014/main" id="{BCB5BBE2-2ABF-DAC8-C7BE-18C9B4E28806}"/>
+                                </a:ext>
+                              </a:extLst>
+                            </p:cNvPr>
+                            <p:cNvGrpSpPr/>
+                            <p:nvPr/>
+                          </p:nvGrpSpPr>
+                          <p:grpSpPr>
+                            <a:xfrm>
+                              <a:off x="46893" y="125785"/>
+                              <a:ext cx="12192000" cy="6919784"/>
+                              <a:chOff x="46893" y="125785"/>
+                              <a:chExt cx="12192000" cy="6919784"/>
+                            </a:xfrm>
+                          </p:grpSpPr>
+                          <p:grpSp>
+                            <p:nvGrpSpPr>
+                              <p:cNvPr id="12" name="Группа 11">
+                                <a:extLst>
+                                  <a:ext uri="{FF2B5EF4-FFF2-40B4-BE49-F238E27FC236}">
+                                    <a16:creationId xmlns:a16="http://schemas.microsoft.com/office/drawing/2014/main" id="{F563AEA8-EB68-B91E-1EDB-98E1904AA55A}"/>
+                                  </a:ext>
+                                </a:extLst>
+                              </p:cNvPr>
+                              <p:cNvGrpSpPr/>
+                              <p:nvPr/>
+                            </p:nvGrpSpPr>
+                            <p:grpSpPr>
+                              <a:xfrm>
+                                <a:off x="46893" y="125785"/>
+                                <a:ext cx="12192000" cy="6919784"/>
+                                <a:chOff x="46893" y="125785"/>
+                                <a:chExt cx="12192000" cy="6919784"/>
+                              </a:xfrm>
+                            </p:grpSpPr>
+                            <p:pic>
+                              <p:nvPicPr>
+                                <p:cNvPr id="3" name="Рисунок 2">
+                                  <a:extLst>
+                                    <a:ext uri="{FF2B5EF4-FFF2-40B4-BE49-F238E27FC236}">
+                                      <a16:creationId xmlns:a16="http://schemas.microsoft.com/office/drawing/2014/main" id="{A2FB3F70-E3B5-D7A5-C871-E51A9BA39B08}"/>
+                                    </a:ext>
+                                  </a:extLst>
+                                </p:cNvPr>
+                                <p:cNvPicPr>
+                                  <a:picLocks noChangeAspect="1"/>
+                                </p:cNvPicPr>
+                                <p:nvPr/>
+                              </p:nvPicPr>
+                              <p:blipFill>
+                                <a:blip r:embed="rId2"/>
+                                <a:stretch>
+                                  <a:fillRect/>
+                                </a:stretch>
+                              </p:blipFill>
+                              <p:spPr>
+                                <a:xfrm>
+                                  <a:off x="46893" y="125785"/>
+                                  <a:ext cx="12192000" cy="6919784"/>
+                                </a:xfrm>
+                                <a:prstGeom prst="rect">
+                                  <a:avLst/>
+                                </a:prstGeom>
+                              </p:spPr>
+                            </p:pic>
+                            <p:cxnSp>
+                              <p:nvCxnSpPr>
+                                <p:cNvPr id="7" name="Прямая со стрелкой 6">
+                                  <a:extLst>
+                                    <a:ext uri="{FF2B5EF4-FFF2-40B4-BE49-F238E27FC236}">
+                                      <a16:creationId xmlns:a16="http://schemas.microsoft.com/office/drawing/2014/main" id="{9100C6FB-A864-2808-74C7-F664B53D107E}"/>
+                                    </a:ext>
+                                  </a:extLst>
+                                </p:cNvPr>
+                                <p:cNvCxnSpPr>
+                                  <a:cxnSpLocks/>
+                                </p:cNvCxnSpPr>
+                                <p:nvPr/>
+                              </p:nvCxnSpPr>
+                              <p:spPr>
+                                <a:xfrm flipV="1">
+                                  <a:off x="4290647" y="1711569"/>
+                                  <a:ext cx="340438" cy="281354"/>
+                                </a:xfrm>
+                                <a:prstGeom prst="straightConnector1">
+                                  <a:avLst/>
+                                </a:prstGeom>
+                                <a:ln w="12700">
+                                  <a:solidFill>
+                                    <a:srgbClr val="FF0000"/>
+                                  </a:solidFill>
+                                  <a:headEnd type="triangle"/>
+                                  <a:tailEnd type="triangle"/>
+                                </a:ln>
+                              </p:spPr>
+                              <p:style>
+                                <a:lnRef idx="1">
+                                  <a:schemeClr val="accent1"/>
+                                </a:lnRef>
+                                <a:fillRef idx="0">
+                                  <a:schemeClr val="accent1"/>
+                                </a:fillRef>
+                                <a:effectRef idx="0">
+                                  <a:schemeClr val="accent1"/>
+                                </a:effectRef>
+                                <a:fontRef idx="minor">
+                                  <a:schemeClr val="tx1"/>
+                                </a:fontRef>
+                              </p:style>
+                            </p:cxnSp>
+                          </p:grpSp>
+                          <p:cxnSp>
+                            <p:nvCxnSpPr>
+                              <p:cNvPr id="14" name="Прямая со стрелкой 13">
+                                <a:extLst>
+                                  <a:ext uri="{FF2B5EF4-FFF2-40B4-BE49-F238E27FC236}">
+                                    <a16:creationId xmlns:a16="http://schemas.microsoft.com/office/drawing/2014/main" id="{5E31FB4A-606D-D7BE-5837-4382C696F430}"/>
+                                  </a:ext>
+                                </a:extLst>
+                              </p:cNvPr>
+                              <p:cNvCxnSpPr>
+                                <a:cxnSpLocks/>
+                              </p:cNvCxnSpPr>
+                              <p:nvPr/>
+                            </p:nvCxnSpPr>
+                            <p:spPr>
+                              <a:xfrm>
+                                <a:off x="6610027" y="1232115"/>
+                                <a:ext cx="2092271" cy="891153"/>
+                              </a:xfrm>
+                              <a:prstGeom prst="straightConnector1">
+                                <a:avLst/>
+                              </a:prstGeom>
+                              <a:ln w="12700">
+                                <a:solidFill>
+                                  <a:srgbClr val="FF0000"/>
+                                </a:solidFill>
+                                <a:headEnd type="triangle"/>
+                                <a:tailEnd type="triangle"/>
+                              </a:ln>
+                            </p:spPr>
+                            <p:style>
+                              <a:lnRef idx="1">
+                                <a:schemeClr val="accent1"/>
+                              </a:lnRef>
+                              <a:fillRef idx="0">
+                                <a:schemeClr val="accent1"/>
+                              </a:fillRef>
+                              <a:effectRef idx="0">
+                                <a:schemeClr val="accent1"/>
+                              </a:effectRef>
+                              <a:fontRef idx="minor">
+                                <a:schemeClr val="tx1"/>
+                              </a:fontRef>
+                            </p:style>
+                          </p:cxnSp>
+                        </p:grpSp>
+                        <p:cxnSp>
+                          <p:nvCxnSpPr>
+                            <p:cNvPr id="19" name="Прямая со стрелкой 18">
+                              <a:extLst>
+                                <a:ext uri="{FF2B5EF4-FFF2-40B4-BE49-F238E27FC236}">
+                                  <a16:creationId xmlns:a16="http://schemas.microsoft.com/office/drawing/2014/main" id="{CC2FF1BE-BDB8-9FA6-234F-A0C5E099DBCF}"/>
+                                </a:ext>
+                              </a:extLst>
+                            </p:cNvPr>
+                            <p:cNvCxnSpPr>
+                              <a:cxnSpLocks/>
+                            </p:cNvCxnSpPr>
+                            <p:nvPr/>
+                          </p:nvCxnSpPr>
+                          <p:spPr>
+                            <a:xfrm>
+                              <a:off x="6555783" y="4796725"/>
+                              <a:ext cx="395207" cy="596685"/>
+                            </a:xfrm>
+                            <a:prstGeom prst="straightConnector1">
+                              <a:avLst/>
+                            </a:prstGeom>
+                            <a:ln w="12700">
+                              <a:solidFill>
+                                <a:srgbClr val="FF0000"/>
+                              </a:solidFill>
+                              <a:headEnd type="triangle"/>
+                              <a:tailEnd type="triangle"/>
+                            </a:ln>
+                          </p:spPr>
+                          <p:style>
+                            <a:lnRef idx="1">
+                              <a:schemeClr val="accent1"/>
+                            </a:lnRef>
+                            <a:fillRef idx="0">
+                              <a:schemeClr val="accent1"/>
+                            </a:fillRef>
+                            <a:effectRef idx="0">
+                              <a:schemeClr val="accent1"/>
+                            </a:effectRef>
+                            <a:fontRef idx="minor">
+                              <a:schemeClr val="tx1"/>
+                            </a:fontRef>
+                          </p:style>
+                        </p:cxnSp>
+                      </p:grpSp>
+                      <p:cxnSp>
+                        <p:nvCxnSpPr>
+                          <p:cNvPr id="23" name="Прямая со стрелкой 22">
+                            <a:extLst>
+                              <a:ext uri="{FF2B5EF4-FFF2-40B4-BE49-F238E27FC236}">
+                                <a16:creationId xmlns:a16="http://schemas.microsoft.com/office/drawing/2014/main" id="{D5082E83-3E69-D851-3E99-4F3718CBBB4D}"/>
+                              </a:ext>
+                            </a:extLst>
+                          </p:cNvPr>
+                          <p:cNvCxnSpPr>
+                            <a:cxnSpLocks/>
+                          </p:cNvCxnSpPr>
+                          <p:nvPr/>
+                        </p:nvCxnSpPr>
+                        <p:spPr>
+                          <a:xfrm>
+                            <a:off x="2588217" y="4207790"/>
+                            <a:ext cx="588936" cy="720671"/>
+                          </a:xfrm>
+                          <a:prstGeom prst="straightConnector1">
+                            <a:avLst/>
+                          </a:prstGeom>
+                          <a:ln w="12700">
+                            <a:solidFill>
+                              <a:srgbClr val="FF0000"/>
+                            </a:solidFill>
+                            <a:headEnd type="triangle"/>
+                            <a:tailEnd type="triangle"/>
+                          </a:ln>
+                        </p:spPr>
+                        <p:style>
+                          <a:lnRef idx="1">
+                            <a:schemeClr val="accent1"/>
+                          </a:lnRef>
+                          <a:fillRef idx="0">
+                            <a:schemeClr val="accent1"/>
+                          </a:fillRef>
+                          <a:effectRef idx="0">
+                            <a:schemeClr val="accent1"/>
+                          </a:effectRef>
+                          <a:fontRef idx="minor">
+                            <a:schemeClr val="tx1"/>
+                          </a:fontRef>
+                        </p:style>
+                      </p:cxnSp>
+                    </p:grpSp>
+                    <p:sp>
+                      <p:nvSpPr>
+                        <p:cNvPr id="26" name="Прямоугольник 25">
+                          <a:extLst>
+                            <a:ext uri="{FF2B5EF4-FFF2-40B4-BE49-F238E27FC236}">
+                              <a16:creationId xmlns:a16="http://schemas.microsoft.com/office/drawing/2014/main" id="{0DBA549B-FF19-C131-8C49-85FC44481817}"/>
+                            </a:ext>
+                          </a:extLst>
+                        </p:cNvPr>
+                        <p:cNvSpPr/>
+                        <p:nvPr/>
+                      </p:nvSpPr>
+                      <p:spPr>
+                        <a:xfrm>
+                          <a:off x="5434402" y="1212303"/>
+                          <a:ext cx="194465" cy="206878"/>
+                        </a:xfrm>
+                        <a:prstGeom prst="rect">
+                          <a:avLst/>
+                        </a:prstGeom>
+                        <a:noFill/>
+                        <a:ln w="19050">
+                          <a:solidFill>
+                            <a:srgbClr val="00B050"/>
+                          </a:solidFill>
+                        </a:ln>
+                      </p:spPr>
+                      <p:style>
+                        <a:lnRef idx="2">
+                          <a:schemeClr val="accent1">
+                            <a:shade val="50000"/>
+                          </a:schemeClr>
+                        </a:lnRef>
+                        <a:fillRef idx="1">
+                          <a:schemeClr val="accent1"/>
+                        </a:fillRef>
+                        <a:effectRef idx="0">
+                          <a:schemeClr val="accent1"/>
+                        </a:effectRef>
+                        <a:fontRef idx="minor">
+                          <a:schemeClr val="lt1"/>
+                        </a:fontRef>
+                      </p:style>
+                      <p:txBody>
+                        <a:bodyPr rtlCol="0" anchor="ctr"/>
+                        <a:lstStyle/>
+                        <a:p>
+                          <a:pPr algn="ctr"/>
+                          <a:endParaRPr lang="ru-US"/>
+                        </a:p>
+                      </p:txBody>
+                    </p:sp>
+                  </p:grpSp>
+                  <p:sp>
+                    <p:nvSpPr>
+                      <p:cNvPr id="28" name="Прямоугольник 27">
+                        <a:extLst>
+                          <a:ext uri="{FF2B5EF4-FFF2-40B4-BE49-F238E27FC236}">
+                            <a16:creationId xmlns:a16="http://schemas.microsoft.com/office/drawing/2014/main" id="{EB771D17-F1DD-C2AB-DDE4-4F4B69694CC1}"/>
+                          </a:ext>
+                        </a:extLst>
+                      </p:cNvPr>
+                      <p:cNvSpPr/>
+                      <p:nvPr/>
+                    </p:nvSpPr>
+                    <p:spPr>
+                      <a:xfrm>
+                        <a:off x="10576813" y="1361283"/>
+                        <a:ext cx="194465" cy="206878"/>
+                      </a:xfrm>
+                      <a:prstGeom prst="rect">
+                        <a:avLst/>
+                      </a:prstGeom>
+                      <a:noFill/>
+                      <a:ln w="19050">
+                        <a:solidFill>
+                          <a:srgbClr val="00B050"/>
+                        </a:solidFill>
+                      </a:ln>
+                    </p:spPr>
+                    <p:style>
+                      <a:lnRef idx="2">
+                        <a:schemeClr val="accent1">
+                          <a:shade val="50000"/>
+                        </a:schemeClr>
+                      </a:lnRef>
+                      <a:fillRef idx="1">
+                        <a:schemeClr val="accent1"/>
+                      </a:fillRef>
+                      <a:effectRef idx="0">
+                        <a:schemeClr val="accent1"/>
+                      </a:effectRef>
+                      <a:fontRef idx="minor">
+                        <a:schemeClr val="lt1"/>
+                      </a:fontRef>
+                    </p:style>
+                    <p:txBody>
+                      <a:bodyPr rtlCol="0" anchor="ctr"/>
+                      <a:lstStyle/>
+                      <a:p>
+                        <a:pPr algn="ctr"/>
+                        <a:endParaRPr lang="ru-US"/>
+                      </a:p>
+                    </p:txBody>
+                  </p:sp>
+                </p:grpSp>
+                <p:sp>
+                  <p:nvSpPr>
+                    <p:cNvPr id="30" name="Прямоугольник 29">
+                      <a:extLst>
+                        <a:ext uri="{FF2B5EF4-FFF2-40B4-BE49-F238E27FC236}">
+                          <a16:creationId xmlns:a16="http://schemas.microsoft.com/office/drawing/2014/main" id="{DBE94A09-7E67-57A4-A588-DC17CDD689BB}"/>
+                        </a:ext>
+                      </a:extLst>
+                    </p:cNvPr>
+                    <p:cNvSpPr/>
+                    <p:nvPr/>
+                  </p:nvSpPr>
+                  <p:spPr>
+                    <a:xfrm>
+                      <a:off x="8936742" y="4345616"/>
+                      <a:ext cx="194465" cy="206878"/>
+                    </a:xfrm>
+                    <a:prstGeom prst="rect">
+                      <a:avLst/>
+                    </a:prstGeom>
+                    <a:noFill/>
+                    <a:ln w="19050">
+                      <a:solidFill>
+                        <a:srgbClr val="00B050"/>
+                      </a:solidFill>
+                    </a:ln>
+                  </p:spPr>
+                  <p:style>
+                    <a:lnRef idx="2">
+                      <a:schemeClr val="accent1">
+                        <a:shade val="50000"/>
+                      </a:schemeClr>
+                    </a:lnRef>
+                    <a:fillRef idx="1">
+                      <a:schemeClr val="accent1"/>
+                    </a:fillRef>
+                    <a:effectRef idx="0">
+                      <a:schemeClr val="accent1"/>
+                    </a:effectRef>
+                    <a:fontRef idx="minor">
+                      <a:schemeClr val="lt1"/>
+                    </a:fontRef>
+                  </p:style>
+                  <p:txBody>
+                    <a:bodyPr rtlCol="0" anchor="ctr"/>
+                    <a:lstStyle/>
+                    <a:p>
+                      <a:pPr algn="ctr"/>
+                      <a:endParaRPr lang="ru-US"/>
+                    </a:p>
+                  </p:txBody>
+                </p:sp>
+              </p:grpSp>
+              <p:sp>
+                <p:nvSpPr>
+                  <p:cNvPr id="32" name="Прямоугольник 31">
+                    <a:extLst>
+                      <a:ext uri="{FF2B5EF4-FFF2-40B4-BE49-F238E27FC236}">
+                        <a16:creationId xmlns:a16="http://schemas.microsoft.com/office/drawing/2014/main" id="{68B8DCE7-1BFE-38DC-ABFE-5D3F467E2323}"/>
+                      </a:ext>
+                    </a:extLst>
+                  </p:cNvPr>
+                  <p:cNvSpPr/>
+                  <p:nvPr/>
+                </p:nvSpPr>
+                <p:spPr>
+                  <a:xfrm>
+                    <a:off x="10088262" y="5054397"/>
+                    <a:ext cx="194465" cy="206878"/>
+                  </a:xfrm>
+                  <a:prstGeom prst="rect">
+                    <a:avLst/>
+                  </a:prstGeom>
+                  <a:noFill/>
+                  <a:ln w="19050">
+                    <a:solidFill>
+                      <a:srgbClr val="00B050"/>
+                    </a:solidFill>
+                  </a:ln>
+                </p:spPr>
+                <p:style>
+                  <a:lnRef idx="2">
+                    <a:schemeClr val="accent1">
+                      <a:shade val="50000"/>
+                    </a:schemeClr>
+                  </a:lnRef>
+                  <a:fillRef idx="1">
+                    <a:schemeClr val="accent1"/>
+                  </a:fillRef>
+                  <a:effectRef idx="0">
+                    <a:schemeClr val="accent1"/>
+                  </a:effectRef>
+                  <a:fontRef idx="minor">
+                    <a:schemeClr val="lt1"/>
+                  </a:fontRef>
+                </p:style>
+                <p:txBody>
+                  <a:bodyPr rtlCol="0" anchor="ctr"/>
+                  <a:lstStyle/>
+                  <a:p>
+                    <a:pPr algn="ctr"/>
+                    <a:endParaRPr lang="ru-US"/>
+                  </a:p>
+                </p:txBody>
+              </p:sp>
+            </p:grpSp>
+            <p:sp>
+              <p:nvSpPr>
+                <p:cNvPr id="37" name="Открывающая квадратная скобка 36">
+                  <a:extLst>
+                    <a:ext uri="{FF2B5EF4-FFF2-40B4-BE49-F238E27FC236}">
+                      <a16:creationId xmlns:a16="http://schemas.microsoft.com/office/drawing/2014/main" id="{5E162008-47B5-DFE1-9CDE-173E72702F62}"/>
+                    </a:ext>
+                  </a:extLst>
+                </p:cNvPr>
+                <p:cNvSpPr/>
+                <p:nvPr/>
+              </p:nvSpPr>
+              <p:spPr>
+                <a:xfrm rot="5400000">
+                  <a:off x="5526888" y="-719105"/>
+                  <a:ext cx="206879" cy="2092271"/>
+                </a:xfrm>
+                <a:prstGeom prst="leftBracket">
+                  <a:avLst/>
+                </a:prstGeom>
+                <a:ln w="19050">
+                  <a:solidFill>
+                    <a:srgbClr val="C00000"/>
+                  </a:solidFill>
+                </a:ln>
+              </p:spPr>
+              <p:style>
+                <a:lnRef idx="1">
+                  <a:schemeClr val="accent1"/>
+                </a:lnRef>
+                <a:fillRef idx="0">
+                  <a:schemeClr val="accent1"/>
+                </a:fillRef>
+                <a:effectRef idx="0">
+                  <a:schemeClr val="accent1"/>
+                </a:effectRef>
+                <a:fontRef idx="minor">
+                  <a:schemeClr val="tx1"/>
+                </a:fontRef>
+              </p:style>
+              <p:txBody>
+                <a:bodyPr rtlCol="0" anchor="ctr"/>
+                <a:lstStyle/>
+                <a:p>
+                  <a:pPr algn="ctr"/>
+                  <a:endParaRPr lang="ru-US"/>
+                </a:p>
+              </p:txBody>
+            </p:sp>
+          </p:grpSp>
+          <p:sp>
+            <p:nvSpPr>
+              <p:cNvPr id="34" name="Открывающая квадратная скобка 33">
+                <a:extLst>
+                  <a:ext uri="{FF2B5EF4-FFF2-40B4-BE49-F238E27FC236}">
+                    <a16:creationId xmlns:a16="http://schemas.microsoft.com/office/drawing/2014/main" id="{3CE964E8-803C-F12B-61B8-B522963AF91B}"/>
+                  </a:ext>
+                </a:extLst>
+              </p:cNvPr>
+              <p:cNvSpPr/>
+              <p:nvPr/>
+            </p:nvSpPr>
+            <p:spPr>
+              <a:xfrm rot="16200000">
+                <a:off x="5526888" y="1275256"/>
+                <a:ext cx="206879" cy="2092271"/>
+              </a:xfrm>
+              <a:prstGeom prst="leftBracket">
+                <a:avLst/>
+              </a:prstGeom>
+              <a:ln w="19050">
+                <a:solidFill>
+                  <a:srgbClr val="C00000"/>
+                </a:solidFill>
+              </a:ln>
+            </p:spPr>
+            <p:style>
+              <a:lnRef idx="1">
+                <a:schemeClr val="accent1"/>
+              </a:lnRef>
+              <a:fillRef idx="0">
+                <a:schemeClr val="accent1"/>
+              </a:fillRef>
+              <a:effectRef idx="0">
+                <a:schemeClr val="accent1"/>
+              </a:effectRef>
+              <a:fontRef idx="minor">
+                <a:schemeClr val="tx1"/>
+              </a:fontRef>
+            </p:style>
+            <p:txBody>
+              <a:bodyPr rtlCol="0" anchor="ctr"/>
+              <a:lstStyle/>
+              <a:p>
+                <a:pPr algn="ctr"/>
+                <a:endParaRPr lang="ru-US"/>
+              </a:p>
+            </p:txBody>
+          </p:sp>
+        </p:grpSp>
+        <p:sp>
+          <p:nvSpPr>
+            <p:cNvPr id="35" name="Открывающая квадратная скобка 34">
+              <a:extLst>
+                <a:ext uri="{FF2B5EF4-FFF2-40B4-BE49-F238E27FC236}">
+                  <a16:creationId xmlns:a16="http://schemas.microsoft.com/office/drawing/2014/main" id="{364A75BB-9E3B-BBD5-5C6E-D1F08BE0B131}"/>
+                </a:ext>
+              </a:extLst>
+            </p:cNvPr>
+            <p:cNvSpPr/>
+            <p:nvPr/>
+          </p:nvSpPr>
+          <p:spPr>
+            <a:xfrm rot="16200000">
+              <a:off x="1716751" y="4582513"/>
+              <a:ext cx="292270" cy="1649793"/>
+            </a:xfrm>
+            <a:prstGeom prst="leftBracket">
+              <a:avLst/>
+            </a:prstGeom>
+            <a:ln w="19050">
+              <a:solidFill>
+                <a:srgbClr val="C00000"/>
+              </a:solidFill>
+            </a:ln>
+          </p:spPr>
+          <p:style>
+            <a:lnRef idx="1">
+              <a:schemeClr val="accent1"/>
+            </a:lnRef>
+            <a:fillRef idx="0">
+              <a:schemeClr val="accent1"/>
+            </a:fillRef>
+            <a:effectRef idx="0">
+              <a:schemeClr val="accent1"/>
+            </a:effectRef>
+            <a:fontRef idx="minor">
+              <a:schemeClr val="tx1"/>
+            </a:fontRef>
+          </p:style>
+          <p:txBody>
+            <a:bodyPr rtlCol="0" anchor="ctr"/>
+            <a:lstStyle/>
+            <a:p>
+              <a:pPr algn="ctr"/>
+              <a:endParaRPr lang="ru-US"/>
+            </a:p>
+          </p:txBody>
+        </p:sp>
+        <p:sp>
+          <p:nvSpPr>
+            <p:cNvPr id="40" name="Открывающая квадратная скобка 39">
+              <a:extLst>
+                <a:ext uri="{FF2B5EF4-FFF2-40B4-BE49-F238E27FC236}">
+                  <a16:creationId xmlns:a16="http://schemas.microsoft.com/office/drawing/2014/main" id="{4903778F-8F35-8D8A-08C2-58FB13E5E9EC}"/>
+                </a:ext>
+              </a:extLst>
+            </p:cNvPr>
+            <p:cNvSpPr/>
+            <p:nvPr/>
+          </p:nvSpPr>
+          <p:spPr>
+            <a:xfrm rot="5400000">
+              <a:off x="1716751" y="2508769"/>
+              <a:ext cx="292270" cy="1649793"/>
+            </a:xfrm>
+            <a:prstGeom prst="leftBracket">
+              <a:avLst/>
+            </a:prstGeom>
+            <a:ln w="19050">
+              <a:solidFill>
+                <a:srgbClr val="C00000"/>
+              </a:solidFill>
+            </a:ln>
+          </p:spPr>
+          <p:style>
+            <a:lnRef idx="1">
+              <a:schemeClr val="accent1"/>
+            </a:lnRef>
+            <a:fillRef idx="0">
+              <a:schemeClr val="accent1"/>
+            </a:fillRef>
+            <a:effectRef idx="0">
+              <a:schemeClr val="accent1"/>
+            </a:effectRef>
+            <a:fontRef idx="minor">
+              <a:schemeClr val="tx1"/>
+            </a:fontRef>
+          </p:style>
+          <p:txBody>
+            <a:bodyPr rtlCol="0" anchor="ctr"/>
+            <a:lstStyle/>
+            <a:p>
+              <a:pPr algn="ctr"/>
+              <a:endParaRPr lang="ru-US"/>
+            </a:p>
+          </p:txBody>
+        </p:sp>
+      </p:grpSp>
+    </p:spTree>
+    <p:extLst>
+      <p:ext uri="{BB962C8B-B14F-4D97-AF65-F5344CB8AC3E}">
+        <p14:creationId xmlns:p14="http://schemas.microsoft.com/office/powerpoint/2010/main" val="2799736894"/>
       </p:ext>
     </p:extLst>
   </p:cSld>

</xml_diff>